<commit_message>
add script and plots
</commit_message>
<xml_diff>
--- a/views_airplane.pptx
+++ b/views_airplane.pptx
@@ -16,8 +16,8 @@
     <p:sldId id="262" r:id="rId10"/>
     <p:sldId id="263" r:id="rId11"/>
     <p:sldId id="264" r:id="rId12"/>
-    <p:sldId id="265" r:id="rId13"/>
-    <p:sldId id="266" r:id="rId14"/>
+    <p:sldId id="266" r:id="rId13"/>
+    <p:sldId id="269" r:id="rId14"/>
   </p:sldIdLst>
   <p:sldSz cx="9144000" cy="6858000" type="screen4x3"/>
   <p:notesSz cx="6858000" cy="9144000"/>
@@ -300,7 +300,7 @@
           <a:p>
             <a:fld id="{84D642EF-3491-BB4F-9AA3-265FFB0D422E}" type="datetimeFigureOut">
               <a:rPr lang="en-US" smtClean="0"/>
-              <a:t>10/13/2016</a:t>
+              <a:t>10/15/16</a:t>
             </a:fld>
             <a:endParaRPr lang="en-US"/>
           </a:p>
@@ -470,7 +470,7 @@
           <a:p>
             <a:fld id="{84D642EF-3491-BB4F-9AA3-265FFB0D422E}" type="datetimeFigureOut">
               <a:rPr lang="en-US" smtClean="0"/>
-              <a:t>10/13/2016</a:t>
+              <a:t>10/15/16</a:t>
             </a:fld>
             <a:endParaRPr lang="en-US"/>
           </a:p>
@@ -650,7 +650,7 @@
           <a:p>
             <a:fld id="{84D642EF-3491-BB4F-9AA3-265FFB0D422E}" type="datetimeFigureOut">
               <a:rPr lang="en-US" smtClean="0"/>
-              <a:t>10/13/2016</a:t>
+              <a:t>10/15/16</a:t>
             </a:fld>
             <a:endParaRPr lang="en-US"/>
           </a:p>
@@ -820,7 +820,7 @@
           <a:p>
             <a:fld id="{84D642EF-3491-BB4F-9AA3-265FFB0D422E}" type="datetimeFigureOut">
               <a:rPr lang="en-US" smtClean="0"/>
-              <a:t>10/13/2016</a:t>
+              <a:t>10/15/16</a:t>
             </a:fld>
             <a:endParaRPr lang="en-US"/>
           </a:p>
@@ -1066,7 +1066,7 @@
           <a:p>
             <a:fld id="{84D642EF-3491-BB4F-9AA3-265FFB0D422E}" type="datetimeFigureOut">
               <a:rPr lang="en-US" smtClean="0"/>
-              <a:t>10/13/2016</a:t>
+              <a:t>10/15/16</a:t>
             </a:fld>
             <a:endParaRPr lang="en-US"/>
           </a:p>
@@ -1354,7 +1354,7 @@
           <a:p>
             <a:fld id="{84D642EF-3491-BB4F-9AA3-265FFB0D422E}" type="datetimeFigureOut">
               <a:rPr lang="en-US" smtClean="0"/>
-              <a:t>10/13/2016</a:t>
+              <a:t>10/15/16</a:t>
             </a:fld>
             <a:endParaRPr lang="en-US"/>
           </a:p>
@@ -1776,7 +1776,7 @@
           <a:p>
             <a:fld id="{84D642EF-3491-BB4F-9AA3-265FFB0D422E}" type="datetimeFigureOut">
               <a:rPr lang="en-US" smtClean="0"/>
-              <a:t>10/13/2016</a:t>
+              <a:t>10/15/16</a:t>
             </a:fld>
             <a:endParaRPr lang="en-US"/>
           </a:p>
@@ -1894,7 +1894,7 @@
           <a:p>
             <a:fld id="{84D642EF-3491-BB4F-9AA3-265FFB0D422E}" type="datetimeFigureOut">
               <a:rPr lang="en-US" smtClean="0"/>
-              <a:t>10/13/2016</a:t>
+              <a:t>10/15/16</a:t>
             </a:fld>
             <a:endParaRPr lang="en-US"/>
           </a:p>
@@ -1989,7 +1989,7 @@
           <a:p>
             <a:fld id="{84D642EF-3491-BB4F-9AA3-265FFB0D422E}" type="datetimeFigureOut">
               <a:rPr lang="en-US" smtClean="0"/>
-              <a:t>10/13/2016</a:t>
+              <a:t>10/15/16</a:t>
             </a:fld>
             <a:endParaRPr lang="en-US"/>
           </a:p>
@@ -2266,7 +2266,7 @@
           <a:p>
             <a:fld id="{84D642EF-3491-BB4F-9AA3-265FFB0D422E}" type="datetimeFigureOut">
               <a:rPr lang="en-US" smtClean="0"/>
-              <a:t>10/13/2016</a:t>
+              <a:t>10/15/16</a:t>
             </a:fld>
             <a:endParaRPr lang="en-US"/>
           </a:p>
@@ -2519,7 +2519,7 @@
           <a:p>
             <a:fld id="{84D642EF-3491-BB4F-9AA3-265FFB0D422E}" type="datetimeFigureOut">
               <a:rPr lang="en-US" smtClean="0"/>
-              <a:t>10/13/2016</a:t>
+              <a:t>10/15/16</a:t>
             </a:fld>
             <a:endParaRPr lang="en-US"/>
           </a:p>
@@ -2732,7 +2732,7 @@
           <a:p>
             <a:fld id="{84D642EF-3491-BB4F-9AA3-265FFB0D422E}" type="datetimeFigureOut">
               <a:rPr lang="en-US" smtClean="0"/>
-              <a:t>10/13/2016</a:t>
+              <a:t>10/15/16</a:t>
             </a:fld>
             <a:endParaRPr lang="en-US"/>
           </a:p>
@@ -3165,11 +3165,7 @@
             </a:pPr>
             <a:r>
               <a:rPr lang="en-US" dirty="0" smtClean="0"/>
-              <a:t>Copy/paste </a:t>
-            </a:r>
-            <a:r>
-              <a:rPr lang="en-US" dirty="0" smtClean="0"/>
-              <a:t>view</a:t>
+              <a:t>Copy/paste view</a:t>
             </a:r>
           </a:p>
           <a:p>
@@ -3211,7 +3207,6 @@
               <a:rPr lang="en-US" dirty="0" smtClean="0"/>
               <a:t>Contrast: 100%</a:t>
             </a:r>
-            <a:endParaRPr lang="en-US" dirty="0" smtClean="0"/>
           </a:p>
           <a:p>
             <a:pPr marL="342900" indent="-342900">
@@ -3242,7 +3237,6 @@
               <a:rPr lang="en-US" dirty="0" smtClean="0"/>
               <a:t>Save photos as PNG</a:t>
             </a:r>
-            <a:endParaRPr lang="en-US" dirty="0" smtClean="0"/>
           </a:p>
           <a:p>
             <a:pPr marL="342900" indent="-342900">
@@ -3266,7 +3260,7 @@
   <p:timing>
     <p:tnLst>
       <p:par>
-        <p:cTn id="1" dur="indefinite" restart="never" nodeType="tmRoot"/>
+        <p:cTn xmlns:p14="http://schemas.microsoft.com/office/powerpoint/2010/main" id="1" dur="indefinite" restart="never" nodeType="tmRoot"/>
       </p:par>
     </p:tnLst>
   </p:timing>
@@ -3510,7 +3504,7 @@
           <a:p>
             <a:r>
               <a:rPr lang="en-US" dirty="0" smtClean="0"/>
-              <a:t>G V</a:t>
+              <a:t>Hawker 800</a:t>
             </a:r>
             <a:endParaRPr lang="en-US" dirty="0"/>
           </a:p>
@@ -3518,72 +3512,44 @@
       </p:sp>
       <p:pic>
         <p:nvPicPr>
-          <p:cNvPr id="5" name="Picture 2"/>
+          <p:cNvPr id="5" name="Picture 4"/>
           <p:cNvPicPr>
-            <a:picLocks noChangeAspect="1" noChangeArrowheads="1"/>
+            <a:picLocks noChangeAspect="1"/>
           </p:cNvPicPr>
           <p:nvPr/>
         </p:nvPicPr>
-        <p:blipFill rotWithShape="1">
+        <p:blipFill>
           <a:blip r:embed="rId2">
             <a:extLst>
               <a:ext uri="{BEBA8EAE-BF5A-486C-A8C5-ECC9F3942E4B}">
                 <a14:imgProps xmlns:a14="http://schemas.microsoft.com/office/drawing/2010/main">
                   <a14:imgLayer r:embed="rId3">
                     <a14:imgEffect>
-                      <a14:backgroundRemoval t="2037" b="38704" l="0" r="84896"/>
-                    </a14:imgEffect>
-                    <a14:imgEffect>
                       <a14:brightnessContrast bright="-100000" contrast="100000"/>
                     </a14:imgEffect>
                   </a14:imgLayer>
                 </a14:imgProps>
               </a:ext>
-              <a:ext uri="{28A0092B-C50C-407E-A947-70E740481C1C}">
-                <a14:useLocalDpi xmlns:a14="http://schemas.microsoft.com/office/drawing/2010/main" val="0"/>
-              </a:ext>
             </a:extLst>
           </a:blip>
-          <a:srcRect l="1000" t="2296" r="15000" b="63778"/>
-          <a:stretch/>
+          <a:stretch>
+            <a:fillRect/>
+          </a:stretch>
         </p:blipFill>
-        <p:spPr bwMode="auto">
+        <p:spPr>
           <a:xfrm flipH="1">
-            <a:off x="0" y="779653"/>
-            <a:ext cx="26755344" cy="6078347"/>
+            <a:off x="153006" y="1311713"/>
+            <a:ext cx="14209776" cy="4724750"/>
           </a:xfrm>
           <a:prstGeom prst="rect">
             <a:avLst/>
           </a:prstGeom>
-          <a:noFill/>
-          <a:ln>
-            <a:noFill/>
-          </a:ln>
-          <a:extLst>
-            <a:ext uri="{909E8E84-426E-40DD-AFC4-6F175D3DCCD1}">
-              <a14:hiddenFill xmlns:a14="http://schemas.microsoft.com/office/drawing/2010/main">
-                <a:solidFill>
-                  <a:schemeClr val="accent1"/>
-                </a:solidFill>
-              </a14:hiddenFill>
-            </a:ext>
-            <a:ext uri="{91240B29-F687-4F45-9708-019B960494DF}">
-              <a14:hiddenLine xmlns:a14="http://schemas.microsoft.com/office/drawing/2010/main" w="9525">
-                <a:solidFill>
-                  <a:schemeClr val="tx1"/>
-                </a:solidFill>
-                <a:miter lim="800000"/>
-                <a:headEnd/>
-                <a:tailEnd/>
-              </a14:hiddenLine>
-            </a:ext>
-          </a:extLst>
         </p:spPr>
       </p:pic>
     </p:spTree>
     <p:extLst>
       <p:ext uri="{BB962C8B-B14F-4D97-AF65-F5344CB8AC3E}">
-        <p14:creationId xmlns:p14="http://schemas.microsoft.com/office/powerpoint/2010/main" val="3442784844"/>
+        <p14:creationId xmlns:p14="http://schemas.microsoft.com/office/powerpoint/2010/main" val="1239394383"/>
       </p:ext>
     </p:extLst>
   </p:cSld>
@@ -3633,8 +3599,8 @@
           <a:lstStyle/>
           <a:p>
             <a:r>
-              <a:rPr lang="en-US" dirty="0" smtClean="0"/>
-              <a:t>Hawker 800</a:t>
+              <a:rPr lang="en-US" dirty="0" err="1" smtClean="0"/>
+              <a:t>HondaJet</a:t>
             </a:r>
             <a:endParaRPr lang="en-US" dirty="0"/>
           </a:p>
@@ -3642,34 +3608,22 @@
       </p:sp>
       <p:pic>
         <p:nvPicPr>
-          <p:cNvPr id="5" name="Picture 4"/>
+          <p:cNvPr id="3" name="Picture 2"/>
           <p:cNvPicPr>
             <a:picLocks noChangeAspect="1"/>
           </p:cNvPicPr>
           <p:nvPr/>
         </p:nvPicPr>
         <p:blipFill>
-          <a:blip r:embed="rId2">
-            <a:extLst>
-              <a:ext uri="{BEBA8EAE-BF5A-486C-A8C5-ECC9F3942E4B}">
-                <a14:imgProps xmlns:a14="http://schemas.microsoft.com/office/drawing/2010/main">
-                  <a14:imgLayer r:embed="rId3">
-                    <a14:imgEffect>
-                      <a14:brightnessContrast bright="-100000" contrast="100000"/>
-                    </a14:imgEffect>
-                  </a14:imgLayer>
-                </a14:imgProps>
-              </a:ext>
-            </a:extLst>
-          </a:blip>
+          <a:blip r:embed="rId2"/>
           <a:stretch>
             <a:fillRect/>
           </a:stretch>
         </p:blipFill>
         <p:spPr>
-          <a:xfrm flipH="1">
-            <a:off x="153006" y="1311713"/>
-            <a:ext cx="14209776" cy="4724750"/>
+          <a:xfrm>
+            <a:off x="0" y="1866900"/>
+            <a:ext cx="11887200" cy="4037917"/>
           </a:xfrm>
           <a:prstGeom prst="rect">
             <a:avLst/>
@@ -3679,7 +3633,7 @@
     </p:spTree>
     <p:extLst>
       <p:ext uri="{BB962C8B-B14F-4D97-AF65-F5344CB8AC3E}">
-        <p14:creationId xmlns:p14="http://schemas.microsoft.com/office/powerpoint/2010/main" val="1239394383"/>
+        <p14:creationId xmlns:p14="http://schemas.microsoft.com/office/powerpoint/2010/main" val="550877092"/>
       </p:ext>
     </p:extLst>
   </p:cSld>
@@ -4178,14 +4132,14 @@
             <a:noFill/>
           </a:ln>
           <a:extLst>
-            <a:ext uri="{909E8E84-426E-40DD-AFC4-6F175D3DCCD1}">
+            <a:ext uri="{909E8E84-426E-40dd-AFC4-6F175D3DCCD1}">
               <a14:hiddenFill xmlns:a14="http://schemas.microsoft.com/office/drawing/2010/main">
                 <a:solidFill>
                   <a:schemeClr val="accent1"/>
                 </a:solidFill>
               </a14:hiddenFill>
             </a:ext>
-            <a:ext uri="{91240B29-F687-4F45-9708-019B960494DF}">
+            <a:ext uri="{91240B29-F687-4f45-9708-019B960494DF}">
               <a14:hiddenLine xmlns:a14="http://schemas.microsoft.com/office/drawing/2010/main" w="9525">
                 <a:solidFill>
                   <a:schemeClr val="tx1"/>
@@ -4364,85 +4318,21 @@
           </a:p>
         </p:txBody>
       </p:sp>
-      <p:pic>
-        <p:nvPicPr>
-          <p:cNvPr id="24" name="Picture 2"/>
-          <p:cNvPicPr>
-            <a:picLocks noChangeAspect="1" noChangeArrowheads="1"/>
-          </p:cNvPicPr>
+      <p:sp>
+        <p:nvSpPr>
+          <p:cNvPr id="25" name="TextBox 24"/>
+          <p:cNvSpPr txBox="1"/>
           <p:nvPr/>
-        </p:nvPicPr>
-        <p:blipFill rotWithShape="1">
-          <a:blip r:embed="rId20">
-            <a:extLst>
-              <a:ext uri="{BEBA8EAE-BF5A-486C-A8C5-ECC9F3942E4B}">
-                <a14:imgProps xmlns:a14="http://schemas.microsoft.com/office/drawing/2010/main">
-                  <a14:imgLayer r:embed="rId21">
-                    <a14:imgEffect>
-                      <a14:backgroundRemoval t="2037" b="38704" l="0" r="84896"/>
-                    </a14:imgEffect>
-                    <a14:imgEffect>
-                      <a14:brightnessContrast bright="-100000" contrast="100000"/>
-                    </a14:imgEffect>
-                  </a14:imgLayer>
-                </a14:imgProps>
-              </a:ext>
-              <a:ext uri="{28A0092B-C50C-407E-A947-70E740481C1C}">
-                <a14:useLocalDpi xmlns:a14="http://schemas.microsoft.com/office/drawing/2010/main" val="0"/>
-              </a:ext>
-            </a:extLst>
-          </a:blip>
-          <a:srcRect l="1000" t="2296" r="15000" b="63778"/>
-          <a:stretch/>
-        </p:blipFill>
-        <p:spPr bwMode="auto">
-          <a:xfrm flipH="1">
-            <a:off x="1871329" y="5681263"/>
-            <a:ext cx="2679192" cy="608666"/>
+        </p:nvSpPr>
+        <p:spPr>
+          <a:xfrm>
+            <a:off x="153005" y="5640961"/>
+            <a:ext cx="1689670" cy="369332"/>
           </a:xfrm>
           <a:prstGeom prst="rect">
             <a:avLst/>
           </a:prstGeom>
           <a:noFill/>
-          <a:ln>
-            <a:noFill/>
-          </a:ln>
-          <a:extLst>
-            <a:ext uri="{909E8E84-426E-40DD-AFC4-6F175D3DCCD1}">
-              <a14:hiddenFill xmlns:a14="http://schemas.microsoft.com/office/drawing/2010/main">
-                <a:solidFill>
-                  <a:schemeClr val="accent1"/>
-                </a:solidFill>
-              </a14:hiddenFill>
-            </a:ext>
-            <a:ext uri="{91240B29-F687-4F45-9708-019B960494DF}">
-              <a14:hiddenLine xmlns:a14="http://schemas.microsoft.com/office/drawing/2010/main" w="9525">
-                <a:solidFill>
-                  <a:schemeClr val="tx1"/>
-                </a:solidFill>
-                <a:miter lim="800000"/>
-                <a:headEnd/>
-                <a:tailEnd/>
-              </a14:hiddenLine>
-            </a:ext>
-          </a:extLst>
-        </p:spPr>
-      </p:pic>
-      <p:sp>
-        <p:nvSpPr>
-          <p:cNvPr id="25" name="TextBox 24"/>
-          <p:cNvSpPr txBox="1"/>
-          <p:nvPr/>
-        </p:nvSpPr>
-        <p:spPr>
-          <a:xfrm>
-            <a:off x="153005" y="5640961"/>
-            <a:ext cx="1689670" cy="369332"/>
-          </a:xfrm>
-          <a:prstGeom prst="rect">
-            <a:avLst/>
-          </a:prstGeom>
-          <a:noFill/>
         </p:spPr>
         <p:txBody>
           <a:bodyPr wrap="square" rtlCol="0">
@@ -4451,8 +4341,8 @@
           <a:lstStyle/>
           <a:p>
             <a:r>
-              <a:rPr lang="en-US" dirty="0" smtClean="0"/>
-              <a:t>G V</a:t>
+              <a:rPr lang="en-US" dirty="0" err="1" smtClean="0"/>
+              <a:t>HondaJet</a:t>
             </a:r>
             <a:endParaRPr lang="en-US" dirty="0"/>
           </a:p>
@@ -4467,11 +4357,11 @@
           <p:nvPr/>
         </p:nvPicPr>
         <p:blipFill>
-          <a:blip r:embed="rId22">
+          <a:blip r:embed="rId20">
             <a:extLst>
               <a:ext uri="{BEBA8EAE-BF5A-486C-A8C5-ECC9F3942E4B}">
                 <a14:imgProps xmlns:a14="http://schemas.microsoft.com/office/drawing/2010/main">
-                  <a14:imgLayer r:embed="rId23">
+                  <a14:imgLayer r:embed="rId21">
                     <a14:imgEffect>
                       <a14:brightnessContrast bright="-100000" contrast="100000"/>
                     </a14:imgEffect>
@@ -4524,6 +4414,30 @@
           </a:p>
         </p:txBody>
       </p:sp>
+      <p:pic>
+        <p:nvPicPr>
+          <p:cNvPr id="28" name="Picture 27"/>
+          <p:cNvPicPr>
+            <a:picLocks noChangeAspect="1"/>
+          </p:cNvPicPr>
+          <p:nvPr/>
+        </p:nvPicPr>
+        <p:blipFill>
+          <a:blip r:embed="rId22"/>
+          <a:stretch>
+            <a:fillRect/>
+          </a:stretch>
+        </p:blipFill>
+        <p:spPr>
+          <a:xfrm>
+            <a:off x="1842675" y="5808397"/>
+            <a:ext cx="1188720" cy="403792"/>
+          </a:xfrm>
+          <a:prstGeom prst="rect">
+            <a:avLst/>
+          </a:prstGeom>
+        </p:spPr>
+      </p:pic>
     </p:spTree>
     <p:extLst>
       <p:ext uri="{BB962C8B-B14F-4D97-AF65-F5344CB8AC3E}">
@@ -4537,7 +4451,7 @@
   <p:timing>
     <p:tnLst>
       <p:par>
-        <p:cTn id="1" dur="indefinite" restart="never" nodeType="tmRoot"/>
+        <p:cTn xmlns:p14="http://schemas.microsoft.com/office/powerpoint/2010/main" id="1" dur="indefinite" restart="never" nodeType="tmRoot"/>
       </p:par>
     </p:tnLst>
   </p:timing>
@@ -5243,14 +5157,14 @@
             <a:noFill/>
           </a:ln>
           <a:extLst>
-            <a:ext uri="{909E8E84-426E-40DD-AFC4-6F175D3DCCD1}">
+            <a:ext uri="{909E8E84-426E-40dd-AFC4-6F175D3DCCD1}">
               <a14:hiddenFill xmlns:a14="http://schemas.microsoft.com/office/drawing/2010/main">
                 <a:solidFill>
                   <a:schemeClr val="accent1"/>
                 </a:solidFill>
               </a14:hiddenFill>
             </a:ext>
-            <a:ext uri="{91240B29-F687-4F45-9708-019B960494DF}">
+            <a:ext uri="{91240B29-F687-4f45-9708-019B960494DF}">
               <a14:hiddenLine xmlns:a14="http://schemas.microsoft.com/office/drawing/2010/main" w="9525">
                 <a:solidFill>
                   <a:schemeClr val="tx1"/>

</xml_diff>